<commit_message>
added some questions and some refs
</commit_message>
<xml_diff>
--- a/Unit 8/pointer.pptx
+++ b/Unit 8/pointer.pptx
@@ -5,7 +5,7 @@
     <p:sldMasterId id="2147483648" r:id="rId1"/>
   </p:sldMasterIdLst>
   <p:notesMasterIdLst>
-    <p:notesMasterId r:id="rId62"/>
+    <p:notesMasterId r:id="rId63"/>
   </p:notesMasterIdLst>
   <p:sldIdLst>
     <p:sldId id="256" r:id="rId2"/>
@@ -67,7 +67,8 @@
     <p:sldId id="342" r:id="rId58"/>
     <p:sldId id="340" r:id="rId59"/>
     <p:sldId id="341" r:id="rId60"/>
-    <p:sldId id="275" r:id="rId61"/>
+    <p:sldId id="343" r:id="rId61"/>
+    <p:sldId id="275" r:id="rId62"/>
   </p:sldIdLst>
   <p:sldSz cx="12192000" cy="6858000"/>
   <p:notesSz cx="6858000" cy="9144000"/>
@@ -256,7 +257,7 @@
           <a:p>
             <a:fld id="{6A1B6C08-A0D3-D74B-9414-6FC7F6BF3615}" type="datetimeFigureOut">
               <a:rPr lang="en-US" smtClean="0"/>
-              <a:t>3/23/16</a:t>
+              <a:t>3/24/16</a:t>
             </a:fld>
             <a:endParaRPr lang="en-US"/>
           </a:p>
@@ -655,7 +656,7 @@
           <a:p>
             <a:fld id="{586CA0A1-9EE8-D947-A1AE-F0369F7FBD0D}" type="datetime1">
               <a:rPr lang="en-US" smtClean="0"/>
-              <a:t>3/23/16</a:t>
+              <a:t>3/24/16</a:t>
             </a:fld>
             <a:endParaRPr lang="en-US"/>
           </a:p>
@@ -829,7 +830,7 @@
           <a:p>
             <a:fld id="{80AD334C-BD37-FA4C-8E42-B5F2C547F21A}" type="datetime1">
               <a:rPr lang="en-US" smtClean="0"/>
-              <a:t>3/23/16</a:t>
+              <a:t>3/24/16</a:t>
             </a:fld>
             <a:endParaRPr lang="en-US"/>
           </a:p>
@@ -1013,7 +1014,7 @@
           <a:p>
             <a:fld id="{610530A4-50EA-E74F-B2A7-33E3E40F0CA2}" type="datetime1">
               <a:rPr lang="en-US" smtClean="0"/>
-              <a:t>3/23/16</a:t>
+              <a:t>3/24/16</a:t>
             </a:fld>
             <a:endParaRPr lang="en-US"/>
           </a:p>
@@ -1187,7 +1188,7 @@
           <a:p>
             <a:fld id="{E5BE7D36-82F8-D141-9C5E-D53A4D497145}" type="datetime1">
               <a:rPr lang="en-US" smtClean="0"/>
-              <a:t>3/23/16</a:t>
+              <a:t>3/24/16</a:t>
             </a:fld>
             <a:endParaRPr lang="en-US"/>
           </a:p>
@@ -1437,7 +1438,7 @@
           <a:p>
             <a:fld id="{767730B6-83E6-5749-85F8-DD91F5393B9D}" type="datetime1">
               <a:rPr lang="en-US" smtClean="0"/>
-              <a:t>3/23/16</a:t>
+              <a:t>3/24/16</a:t>
             </a:fld>
             <a:endParaRPr lang="en-US"/>
           </a:p>
@@ -1673,7 +1674,7 @@
           <a:p>
             <a:fld id="{756D51F4-7346-174A-BE2E-0D8F77BA6B63}" type="datetime1">
               <a:rPr lang="en-US" smtClean="0"/>
-              <a:t>3/23/16</a:t>
+              <a:t>3/24/16</a:t>
             </a:fld>
             <a:endParaRPr lang="en-US"/>
           </a:p>
@@ -2044,7 +2045,7 @@
           <a:p>
             <a:fld id="{0157896D-7122-AD44-9270-24E05AD3A1F2}" type="datetime1">
               <a:rPr lang="en-US" smtClean="0"/>
-              <a:t>3/23/16</a:t>
+              <a:t>3/24/16</a:t>
             </a:fld>
             <a:endParaRPr lang="en-US"/>
           </a:p>
@@ -2166,7 +2167,7 @@
           <a:p>
             <a:fld id="{A4285A25-C949-FC43-B87A-2DF92D8E25ED}" type="datetime1">
               <a:rPr lang="en-US" smtClean="0"/>
-              <a:t>3/23/16</a:t>
+              <a:t>3/24/16</a:t>
             </a:fld>
             <a:endParaRPr lang="en-US"/>
           </a:p>
@@ -2265,7 +2266,7 @@
           <a:p>
             <a:fld id="{82D66296-C513-CD47-94EB-72C87AFCE344}" type="datetime1">
               <a:rPr lang="en-US" smtClean="0"/>
-              <a:t>3/23/16</a:t>
+              <a:t>3/24/16</a:t>
             </a:fld>
             <a:endParaRPr lang="en-US"/>
           </a:p>
@@ -2546,7 +2547,7 @@
           <a:p>
             <a:fld id="{46C12CBD-222B-0A4D-81E1-2423A2D55605}" type="datetime1">
               <a:rPr lang="en-US" smtClean="0"/>
-              <a:t>3/23/16</a:t>
+              <a:t>3/24/16</a:t>
             </a:fld>
             <a:endParaRPr lang="en-US"/>
           </a:p>
@@ -2803,7 +2804,7 @@
           <a:p>
             <a:fld id="{3F685F27-7C40-1448-9E50-A80B02C672DB}" type="datetime1">
               <a:rPr lang="en-US" smtClean="0"/>
-              <a:t>3/23/16</a:t>
+              <a:t>3/24/16</a:t>
             </a:fld>
             <a:endParaRPr lang="en-US"/>
           </a:p>
@@ -3020,7 +3021,7 @@
           <a:p>
             <a:fld id="{D0B55D32-2DDA-BD4C-A2A1-2C315D465DB4}" type="datetime1">
               <a:rPr lang="en-US" smtClean="0"/>
-              <a:t>3/23/16</a:t>
+              <a:t>3/24/16</a:t>
             </a:fld>
             <a:endParaRPr lang="en-US"/>
           </a:p>
@@ -3720,7 +3721,7 @@
           <a:p>
             <a:fld id="{D60F355B-B081-7348-9FD0-DB378FD709E6}" type="datetime1">
               <a:rPr lang="en-US" smtClean="0"/>
-              <a:t>3/23/16</a:t>
+              <a:t>3/24/16</a:t>
             </a:fld>
             <a:endParaRPr lang="en-US"/>
           </a:p>
@@ -4040,7 +4041,7 @@
           <a:p>
             <a:fld id="{D60F355B-B081-7348-9FD0-DB378FD709E6}" type="datetime1">
               <a:rPr lang="en-US" smtClean="0"/>
-              <a:t>3/23/16</a:t>
+              <a:t>3/24/16</a:t>
             </a:fld>
             <a:endParaRPr lang="en-US"/>
           </a:p>
@@ -4367,7 +4368,7 @@
           <a:p>
             <a:fld id="{D60F355B-B081-7348-9FD0-DB378FD709E6}" type="datetime1">
               <a:rPr lang="en-US" smtClean="0"/>
-              <a:t>3/23/16</a:t>
+              <a:t>3/24/16</a:t>
             </a:fld>
             <a:endParaRPr lang="en-US"/>
           </a:p>
@@ -4733,7 +4734,7 @@
           <a:p>
             <a:fld id="{D60F355B-B081-7348-9FD0-DB378FD709E6}" type="datetime1">
               <a:rPr lang="en-US" smtClean="0"/>
-              <a:t>3/23/16</a:t>
+              <a:t>3/24/16</a:t>
             </a:fld>
             <a:endParaRPr lang="en-US"/>
           </a:p>
@@ -5292,7 +5293,7 @@
           <a:p>
             <a:fld id="{D60F355B-B081-7348-9FD0-DB378FD709E6}" type="datetime1">
               <a:rPr lang="en-US" smtClean="0"/>
-              <a:t>3/23/16</a:t>
+              <a:t>3/24/16</a:t>
             </a:fld>
             <a:endParaRPr lang="en-US"/>
           </a:p>
@@ -5549,7 +5550,7 @@
           <a:p>
             <a:fld id="{D60F355B-B081-7348-9FD0-DB378FD709E6}" type="datetime1">
               <a:rPr lang="en-US" smtClean="0"/>
-              <a:t>3/23/16</a:t>
+              <a:t>3/24/16</a:t>
             </a:fld>
             <a:endParaRPr lang="en-US"/>
           </a:p>
@@ -5891,7 +5892,7 @@
           <a:p>
             <a:fld id="{D60F355B-B081-7348-9FD0-DB378FD709E6}" type="datetime1">
               <a:rPr lang="en-US" smtClean="0"/>
-              <a:t>3/23/16</a:t>
+              <a:t>3/24/16</a:t>
             </a:fld>
             <a:endParaRPr lang="en-US"/>
           </a:p>
@@ -6111,7 +6112,7 @@
           <a:p>
             <a:fld id="{D60F355B-B081-7348-9FD0-DB378FD709E6}" type="datetime1">
               <a:rPr lang="en-US" smtClean="0"/>
-              <a:t>3/23/16</a:t>
+              <a:t>3/24/16</a:t>
             </a:fld>
             <a:endParaRPr lang="en-US"/>
           </a:p>
@@ -6318,7 +6319,7 @@
           <a:p>
             <a:fld id="{D60F355B-B081-7348-9FD0-DB378FD709E6}" type="datetime1">
               <a:rPr lang="en-US" smtClean="0"/>
-              <a:t>3/23/16</a:t>
+              <a:t>3/24/16</a:t>
             </a:fld>
             <a:endParaRPr lang="en-US"/>
           </a:p>
@@ -6597,7 +6598,7 @@
           <a:p>
             <a:fld id="{D60F355B-B081-7348-9FD0-DB378FD709E6}" type="datetime1">
               <a:rPr lang="en-US" smtClean="0"/>
-              <a:t>3/23/16</a:t>
+              <a:t>3/24/16</a:t>
             </a:fld>
             <a:endParaRPr lang="en-US"/>
           </a:p>
@@ -6783,7 +6784,7 @@
           <a:p>
             <a:fld id="{36E1E297-93EF-934C-AEA9-392476BDB436}" type="datetime1">
               <a:rPr lang="en-US" smtClean="0"/>
-              <a:t>3/23/16</a:t>
+              <a:t>3/24/16</a:t>
             </a:fld>
             <a:endParaRPr lang="en-US"/>
           </a:p>
@@ -7075,7 +7076,7 @@
           <a:p>
             <a:fld id="{D60F355B-B081-7348-9FD0-DB378FD709E6}" type="datetime1">
               <a:rPr lang="en-US" smtClean="0"/>
-              <a:t>3/23/16</a:t>
+              <a:t>3/24/16</a:t>
             </a:fld>
             <a:endParaRPr lang="en-US"/>
           </a:p>
@@ -7424,7 +7425,7 @@
           <a:p>
             <a:fld id="{FF7EFB7B-DE71-0E4B-91D4-1D8B25020B15}" type="datetime1">
               <a:rPr lang="en-US" smtClean="0"/>
-              <a:t>3/23/16</a:t>
+              <a:t>3/24/16</a:t>
             </a:fld>
             <a:endParaRPr lang="en-US"/>
           </a:p>
@@ -8039,7 +8040,7 @@
           <a:p>
             <a:fld id="{FF7EFB7B-DE71-0E4B-91D4-1D8B25020B15}" type="datetime1">
               <a:rPr lang="en-US" smtClean="0"/>
-              <a:t>3/23/16</a:t>
+              <a:t>3/24/16</a:t>
             </a:fld>
             <a:endParaRPr lang="en-US"/>
           </a:p>
@@ -8407,7 +8408,7 @@
           <a:p>
             <a:fld id="{FF7EFB7B-DE71-0E4B-91D4-1D8B25020B15}" type="datetime1">
               <a:rPr lang="en-US" smtClean="0"/>
-              <a:t>3/23/16</a:t>
+              <a:t>3/24/16</a:t>
             </a:fld>
             <a:endParaRPr lang="en-US"/>
           </a:p>
@@ -8674,7 +8675,7 @@
           <a:p>
             <a:fld id="{FF7EFB7B-DE71-0E4B-91D4-1D8B25020B15}" type="datetime1">
               <a:rPr lang="en-US" smtClean="0"/>
-              <a:t>3/23/16</a:t>
+              <a:t>3/24/16</a:t>
             </a:fld>
             <a:endParaRPr lang="en-US"/>
           </a:p>
@@ -8855,7 +8856,7 @@
           <a:p>
             <a:fld id="{FF7EFB7B-DE71-0E4B-91D4-1D8B25020B15}" type="datetime1">
               <a:rPr lang="en-US" smtClean="0"/>
-              <a:t>3/23/16</a:t>
+              <a:t>3/24/16</a:t>
             </a:fld>
             <a:endParaRPr lang="en-US"/>
           </a:p>
@@ -9695,7 +9696,7 @@
           <a:p>
             <a:fld id="{FF7EFB7B-DE71-0E4B-91D4-1D8B25020B15}" type="datetime1">
               <a:rPr lang="en-US" smtClean="0"/>
-              <a:t>3/23/16</a:t>
+              <a:t>3/24/16</a:t>
             </a:fld>
             <a:endParaRPr lang="en-US"/>
           </a:p>
@@ -10215,7 +10216,7 @@
           <a:p>
             <a:fld id="{FF7EFB7B-DE71-0E4B-91D4-1D8B25020B15}" type="datetime1">
               <a:rPr lang="en-US" smtClean="0"/>
-              <a:t>3/23/16</a:t>
+              <a:t>3/24/16</a:t>
             </a:fld>
             <a:endParaRPr lang="en-US"/>
           </a:p>
@@ -10821,7 +10822,7 @@
           <a:p>
             <a:fld id="{FF7EFB7B-DE71-0E4B-91D4-1D8B25020B15}" type="datetime1">
               <a:rPr lang="en-US" smtClean="0"/>
-              <a:t>3/23/16</a:t>
+              <a:t>3/24/16</a:t>
             </a:fld>
             <a:endParaRPr lang="en-US"/>
           </a:p>
@@ -11174,7 +11175,7 @@
           <a:p>
             <a:fld id="{FF7EFB7B-DE71-0E4B-91D4-1D8B25020B15}" type="datetime1">
               <a:rPr lang="en-US" smtClean="0"/>
-              <a:t>3/23/16</a:t>
+              <a:t>3/24/16</a:t>
             </a:fld>
             <a:endParaRPr lang="en-US"/>
           </a:p>
@@ -11413,7 +11414,7 @@
           <a:p>
             <a:fld id="{D60F355B-B081-7348-9FD0-DB378FD709E6}" type="datetime1">
               <a:rPr lang="en-US" smtClean="0"/>
-              <a:t>3/23/16</a:t>
+              <a:t>3/24/16</a:t>
             </a:fld>
             <a:endParaRPr lang="en-US"/>
           </a:p>
@@ -11512,7 +11513,7 @@
           <a:p>
             <a:fld id="{FF7EFB7B-DE71-0E4B-91D4-1D8B25020B15}" type="datetime1">
               <a:rPr lang="en-US" smtClean="0"/>
-              <a:t>3/23/16</a:t>
+              <a:t>3/24/16</a:t>
             </a:fld>
             <a:endParaRPr lang="en-US"/>
           </a:p>
@@ -13684,7 +13685,7 @@
           <a:p>
             <a:fld id="{FF7EFB7B-DE71-0E4B-91D4-1D8B25020B15}" type="datetime1">
               <a:rPr lang="en-US" smtClean="0"/>
-              <a:t>3/23/16</a:t>
+              <a:t>3/24/16</a:t>
             </a:fld>
             <a:endParaRPr lang="en-US"/>
           </a:p>
@@ -14193,7 +14194,7 @@
           <a:p>
             <a:fld id="{FF7EFB7B-DE71-0E4B-91D4-1D8B25020B15}" type="datetime1">
               <a:rPr lang="en-US" smtClean="0"/>
-              <a:t>3/23/16</a:t>
+              <a:t>3/24/16</a:t>
             </a:fld>
             <a:endParaRPr lang="en-US"/>
           </a:p>
@@ -14958,7 +14959,7 @@
           <a:p>
             <a:fld id="{FF7EFB7B-DE71-0E4B-91D4-1D8B25020B15}" type="datetime1">
               <a:rPr lang="en-US" smtClean="0"/>
-              <a:t>3/23/16</a:t>
+              <a:t>3/24/16</a:t>
             </a:fld>
             <a:endParaRPr lang="en-US"/>
           </a:p>
@@ -16846,7 +16847,7 @@
           <a:p>
             <a:fld id="{FF7EFB7B-DE71-0E4B-91D4-1D8B25020B15}" type="datetime1">
               <a:rPr lang="en-US" smtClean="0"/>
-              <a:t>3/23/16</a:t>
+              <a:t>3/24/16</a:t>
             </a:fld>
             <a:endParaRPr lang="en-US"/>
           </a:p>
@@ -16945,7 +16946,7 @@
           <a:p>
             <a:fld id="{FF7EFB7B-DE71-0E4B-91D4-1D8B25020B15}" type="datetime1">
               <a:rPr lang="en-US" smtClean="0"/>
-              <a:t>3/23/16</a:t>
+              <a:t>3/24/16</a:t>
             </a:fld>
             <a:endParaRPr lang="en-US"/>
           </a:p>
@@ -19220,7 +19221,7 @@
           <a:p>
             <a:fld id="{FF7EFB7B-DE71-0E4B-91D4-1D8B25020B15}" type="datetime1">
               <a:rPr lang="en-US" smtClean="0"/>
-              <a:t>3/23/16</a:t>
+              <a:t>3/24/16</a:t>
             </a:fld>
             <a:endParaRPr lang="en-US"/>
           </a:p>
@@ -20619,7 +20620,7 @@
           <a:p>
             <a:fld id="{FF7EFB7B-DE71-0E4B-91D4-1D8B25020B15}" type="datetime1">
               <a:rPr lang="en-US" smtClean="0"/>
-              <a:t>3/23/16</a:t>
+              <a:t>3/24/16</a:t>
             </a:fld>
             <a:endParaRPr lang="en-US"/>
           </a:p>
@@ -20751,7 +20752,7 @@
           <a:p>
             <a:fld id="{FF7EFB7B-DE71-0E4B-91D4-1D8B25020B15}" type="datetime1">
               <a:rPr lang="en-US" smtClean="0"/>
-              <a:t>3/23/16</a:t>
+              <a:t>3/24/16</a:t>
             </a:fld>
             <a:endParaRPr lang="en-US"/>
           </a:p>
@@ -21170,7 +21171,7 @@
           <a:p>
             <a:fld id="{FF7EFB7B-DE71-0E4B-91D4-1D8B25020B15}" type="datetime1">
               <a:rPr lang="en-US" smtClean="0"/>
-              <a:t>3/23/16</a:t>
+              <a:t>3/24/16</a:t>
             </a:fld>
             <a:endParaRPr lang="en-US"/>
           </a:p>
@@ -21489,7 +21490,7 @@
           <a:p>
             <a:fld id="{D60F355B-B081-7348-9FD0-DB378FD709E6}" type="datetime1">
               <a:rPr lang="en-US" smtClean="0"/>
-              <a:t>3/23/16</a:t>
+              <a:t>3/24/16</a:t>
             </a:fld>
             <a:endParaRPr lang="en-US"/>
           </a:p>
@@ -21776,7 +21777,7 @@
           <a:p>
             <a:fld id="{FF7EFB7B-DE71-0E4B-91D4-1D8B25020B15}" type="datetime1">
               <a:rPr lang="en-US" smtClean="0"/>
-              <a:t>3/23/16</a:t>
+              <a:t>3/24/16</a:t>
             </a:fld>
             <a:endParaRPr lang="en-US"/>
           </a:p>
@@ -23663,7 +23664,7 @@
           <a:p>
             <a:fld id="{FF7EFB7B-DE71-0E4B-91D4-1D8B25020B15}" type="datetime1">
               <a:rPr lang="en-US" smtClean="0"/>
-              <a:t>3/23/16</a:t>
+              <a:t>3/24/16</a:t>
             </a:fld>
             <a:endParaRPr lang="en-US"/>
           </a:p>
@@ -23850,7 +23851,7 @@
           <a:p>
             <a:fld id="{FF7EFB7B-DE71-0E4B-91D4-1D8B25020B15}" type="datetime1">
               <a:rPr lang="en-US" smtClean="0"/>
-              <a:t>3/23/16</a:t>
+              <a:t>3/24/16</a:t>
             </a:fld>
             <a:endParaRPr lang="en-US"/>
           </a:p>
@@ -24622,7 +24623,7 @@
           <a:p>
             <a:fld id="{FF7EFB7B-DE71-0E4B-91D4-1D8B25020B15}" type="datetime1">
               <a:rPr lang="en-US" smtClean="0"/>
-              <a:t>3/23/16</a:t>
+              <a:t>3/24/16</a:t>
             </a:fld>
             <a:endParaRPr lang="en-US"/>
           </a:p>
@@ -24830,7 +24831,7 @@
           <a:p>
             <a:fld id="{FF7EFB7B-DE71-0E4B-91D4-1D8B25020B15}" type="datetime1">
               <a:rPr lang="en-US" smtClean="0"/>
-              <a:t>3/23/16</a:t>
+              <a:t>3/24/16</a:t>
             </a:fld>
             <a:endParaRPr lang="en-US"/>
           </a:p>
@@ -25063,7 +25064,7 @@
           <a:p>
             <a:fld id="{FF7EFB7B-DE71-0E4B-91D4-1D8B25020B15}" type="datetime1">
               <a:rPr lang="en-US" smtClean="0"/>
-              <a:t>3/23/16</a:t>
+              <a:t>3/24/16</a:t>
             </a:fld>
             <a:endParaRPr lang="en-US"/>
           </a:p>
@@ -25484,7 +25485,7 @@
           <a:p>
             <a:fld id="{FF7EFB7B-DE71-0E4B-91D4-1D8B25020B15}" type="datetime1">
               <a:rPr lang="en-US" smtClean="0"/>
-              <a:t>3/23/16</a:t>
+              <a:t>3/24/16</a:t>
             </a:fld>
             <a:endParaRPr lang="en-US"/>
           </a:p>
@@ -25885,7 +25886,7 @@
           <a:p>
             <a:fld id="{FF7EFB7B-DE71-0E4B-91D4-1D8B25020B15}" type="datetime1">
               <a:rPr lang="en-US" smtClean="0"/>
-              <a:t>3/23/16</a:t>
+              <a:t>3/24/16</a:t>
             </a:fld>
             <a:endParaRPr lang="en-US"/>
           </a:p>
@@ -26420,7 +26421,7 @@
           <a:p>
             <a:fld id="{FF7EFB7B-DE71-0E4B-91D4-1D8B25020B15}" type="datetime1">
               <a:rPr lang="en-US" smtClean="0"/>
-              <a:t>3/23/16</a:t>
+              <a:t>3/24/16</a:t>
             </a:fld>
             <a:endParaRPr lang="en-US"/>
           </a:p>
@@ -27010,7 +27011,7 @@
           <a:p>
             <a:fld id="{D60F355B-B081-7348-9FD0-DB378FD709E6}" type="datetime1">
               <a:rPr lang="en-US" smtClean="0"/>
-              <a:t>3/23/16</a:t>
+              <a:t>3/24/16</a:t>
             </a:fld>
             <a:endParaRPr lang="en-US"/>
           </a:p>
@@ -27179,7 +27180,7 @@
           <a:p>
             <a:fld id="{FF7EFB7B-DE71-0E4B-91D4-1D8B25020B15}" type="datetime1">
               <a:rPr lang="en-US" smtClean="0"/>
-              <a:t>3/23/16</a:t>
+              <a:t>3/24/16</a:t>
             </a:fld>
             <a:endParaRPr lang="en-US"/>
           </a:p>
@@ -27351,7 +27352,7 @@
           <a:p>
             <a:fld id="{FF7EFB7B-DE71-0E4B-91D4-1D8B25020B15}" type="datetime1">
               <a:rPr lang="en-US" smtClean="0"/>
-              <a:t>3/23/16</a:t>
+              <a:t>3/24/16</a:t>
             </a:fld>
             <a:endParaRPr lang="en-US"/>
           </a:p>
@@ -28442,13 +28443,7 @@
               <a:rPr lang="en-US" b="1" dirty="0" err="1" smtClean="0">
                 <a:latin typeface="+mj-lt"/>
               </a:rPr>
-              <a:t>p</a:t>
-            </a:r>
-            <a:r>
-              <a:rPr lang="en-US" b="1" dirty="0" err="1" smtClean="0">
-                <a:latin typeface="+mj-lt"/>
-              </a:rPr>
-              <a:t>tr</a:t>
+              <a:t>ptr</a:t>
             </a:r>
             <a:r>
               <a:rPr lang="en-US" b="1" dirty="0" smtClean="0">
@@ -29140,7 +29135,7 @@
           <a:p>
             <a:fld id="{FF7EFB7B-DE71-0E4B-91D4-1D8B25020B15}" type="datetime1">
               <a:rPr lang="en-US" smtClean="0"/>
-              <a:t>3/23/16</a:t>
+              <a:t>3/24/16</a:t>
             </a:fld>
             <a:endParaRPr lang="en-US"/>
           </a:p>
@@ -29250,11 +29245,7 @@
             </a:r>
             <a:r>
               <a:rPr lang="en-US" sz="3200" b="1" dirty="0" err="1" smtClean="0"/>
-              <a:t>r</a:t>
-            </a:r>
-            <a:r>
-              <a:rPr lang="en-US" sz="3200" b="1" dirty="0" err="1" smtClean="0"/>
-              <a:t>ealloc</a:t>
+              <a:t>realloc</a:t>
             </a:r>
             <a:r>
               <a:rPr lang="en-US" sz="3200" b="1" dirty="0" smtClean="0"/>
@@ -29620,9 +29611,6 @@
               </a:rPr>
               <a:t> and returns a pointer to the first byte of the new memory block and on failure the function return NULL</a:t>
             </a:r>
-            <a:endParaRPr lang="en-US" dirty="0" smtClean="0">
-              <a:latin typeface="+mj-lt"/>
-            </a:endParaRPr>
           </a:p>
         </p:txBody>
       </p:sp>
@@ -29957,7 +29945,7 @@
           <a:p>
             <a:fld id="{D60F355B-B081-7348-9FD0-DB378FD709E6}" type="datetime1">
               <a:rPr lang="en-US" smtClean="0"/>
-              <a:t>3/23/16</a:t>
+              <a:t>3/24/16</a:t>
             </a:fld>
             <a:endParaRPr lang="en-US"/>
           </a:p>
@@ -30853,6 +30841,241 @@
           <a:lstStyle/>
           <a:p>
             <a:r>
+              <a:rPr lang="en-US" sz="3200" b="1" dirty="0" smtClean="0"/>
+              <a:t>Pointer Programs</a:t>
+            </a:r>
+            <a:endParaRPr lang="en-US" sz="3200" b="1" dirty="0"/>
+          </a:p>
+        </p:txBody>
+      </p:sp>
+      <p:sp>
+        <p:nvSpPr>
+          <p:cNvPr id="3" name="Content Placeholder 2"/>
+          <p:cNvSpPr>
+            <a:spLocks noGrp="1"/>
+          </p:cNvSpPr>
+          <p:nvPr>
+            <p:ph idx="1"/>
+          </p:nvPr>
+        </p:nvSpPr>
+        <p:spPr>
+          <a:xfrm>
+            <a:off x="838200" y="1237129"/>
+            <a:ext cx="10515600" cy="4939834"/>
+          </a:xfrm>
+        </p:spPr>
+        <p:txBody>
+          <a:bodyPr>
+            <a:normAutofit/>
+          </a:bodyPr>
+          <a:lstStyle/>
+          <a:p>
+            <a:r>
+              <a:rPr lang="en-US" dirty="0" smtClean="0">
+                <a:latin typeface="+mj-lt"/>
+              </a:rPr>
+              <a:t>For pointer programs please do visit:</a:t>
+            </a:r>
+          </a:p>
+          <a:p>
+            <a:pPr marL="0" indent="0">
+              <a:buNone/>
+            </a:pPr>
+            <a:r>
+              <a:rPr lang="en-US" dirty="0">
+                <a:latin typeface="+mj-lt"/>
+                <a:hlinkClick r:id="rId2"/>
+              </a:rPr>
+              <a:t>https://</a:t>
+            </a:r>
+            <a:r>
+              <a:rPr lang="en-US" dirty="0" smtClean="0">
+                <a:latin typeface="+mj-lt"/>
+                <a:hlinkClick r:id="rId2"/>
+              </a:rPr>
+              <a:t>github.com/ashim888/csit-c/tree/master/codes/pointer</a:t>
+            </a:r>
+            <a:endParaRPr lang="en-US" dirty="0" smtClean="0">
+              <a:latin typeface="+mj-lt"/>
+            </a:endParaRPr>
+          </a:p>
+          <a:p>
+            <a:pPr marL="0" indent="0">
+              <a:buNone/>
+            </a:pPr>
+            <a:endParaRPr lang="en-US" dirty="0">
+              <a:latin typeface="+mj-lt"/>
+            </a:endParaRPr>
+          </a:p>
+          <a:p>
+            <a:r>
+              <a:rPr lang="en-US" dirty="0" smtClean="0">
+                <a:latin typeface="+mj-lt"/>
+              </a:rPr>
+              <a:t>For pointer Assignment please do visit:</a:t>
+            </a:r>
+          </a:p>
+          <a:p>
+            <a:pPr marL="0" indent="0">
+              <a:buNone/>
+            </a:pPr>
+            <a:r>
+              <a:rPr lang="en-US" dirty="0">
+                <a:latin typeface="+mj-lt"/>
+                <a:hlinkClick r:id="rId3" invalidUrl="https://github.com/ashim888/csit-c/tree/master/Unit 8"/>
+              </a:rPr>
+              <a:t>https</a:t>
+            </a:r>
+            <a:r>
+              <a:rPr lang="en-US" dirty="0">
+                <a:latin typeface="+mj-lt"/>
+                <a:hlinkClick r:id="rId4" invalidUrl="https://github.com/ashim888/csit-c/tree/master/Unit 8"/>
+              </a:rPr>
+              <a:t>://</a:t>
+            </a:r>
+            <a:r>
+              <a:rPr lang="en-US" dirty="0" smtClean="0">
+                <a:latin typeface="+mj-lt"/>
+                <a:hlinkClick r:id="rId5" invalidUrl="https://github.com/ashim888/csit-c/tree/master/Unit 8"/>
+              </a:rPr>
+              <a:t>github.com/ashim888/csit-c/tree/master/Unit%208</a:t>
+            </a:r>
+            <a:endParaRPr lang="en-US" dirty="0" smtClean="0">
+              <a:latin typeface="+mj-lt"/>
+            </a:endParaRPr>
+          </a:p>
+          <a:p>
+            <a:pPr marL="0" indent="0">
+              <a:buNone/>
+            </a:pPr>
+            <a:endParaRPr lang="en-US" dirty="0">
+              <a:latin typeface="+mj-lt"/>
+            </a:endParaRPr>
+          </a:p>
+        </p:txBody>
+      </p:sp>
+      <p:sp>
+        <p:nvSpPr>
+          <p:cNvPr id="4" name="Date Placeholder 3"/>
+          <p:cNvSpPr>
+            <a:spLocks noGrp="1"/>
+          </p:cNvSpPr>
+          <p:nvPr>
+            <p:ph type="dt" sz="half" idx="10"/>
+          </p:nvPr>
+        </p:nvSpPr>
+        <p:spPr/>
+        <p:txBody>
+          <a:bodyPr/>
+          <a:lstStyle/>
+          <a:p>
+            <a:fld id="{FF7EFB7B-DE71-0E4B-91D4-1D8B25020B15}" type="datetime1">
+              <a:rPr lang="en-US" smtClean="0"/>
+              <a:t>3/24/16</a:t>
+            </a:fld>
+            <a:endParaRPr lang="en-US"/>
+          </a:p>
+        </p:txBody>
+      </p:sp>
+      <p:sp>
+        <p:nvSpPr>
+          <p:cNvPr id="5" name="Footer Placeholder 4"/>
+          <p:cNvSpPr>
+            <a:spLocks noGrp="1"/>
+          </p:cNvSpPr>
+          <p:nvPr>
+            <p:ph type="ftr" sz="quarter" idx="11"/>
+          </p:nvPr>
+        </p:nvSpPr>
+        <p:spPr/>
+        <p:txBody>
+          <a:bodyPr/>
+          <a:lstStyle/>
+          <a:p>
+            <a:r>
+              <a:rPr lang="en-US" smtClean="0"/>
+              <a:t>Ashim Lamichhane</a:t>
+            </a:r>
+            <a:endParaRPr lang="en-US"/>
+          </a:p>
+        </p:txBody>
+      </p:sp>
+      <p:sp>
+        <p:nvSpPr>
+          <p:cNvPr id="6" name="Slide Number Placeholder 5"/>
+          <p:cNvSpPr>
+            <a:spLocks noGrp="1"/>
+          </p:cNvSpPr>
+          <p:nvPr>
+            <p:ph type="sldNum" sz="quarter" idx="12"/>
+          </p:nvPr>
+        </p:nvSpPr>
+        <p:spPr/>
+        <p:txBody>
+          <a:bodyPr/>
+          <a:lstStyle/>
+          <a:p>
+            <a:fld id="{5F6DF98B-7C24-4C4A-9857-F9CABD08DE4C}" type="slidenum">
+              <a:rPr lang="en-US" smtClean="0"/>
+              <a:t>60</a:t>
+            </a:fld>
+            <a:endParaRPr lang="en-US"/>
+          </a:p>
+        </p:txBody>
+      </p:sp>
+    </p:spTree>
+    <p:extLst>
+      <p:ext uri="{BB962C8B-B14F-4D97-AF65-F5344CB8AC3E}">
+        <p14:creationId xmlns:p14="http://schemas.microsoft.com/office/powerpoint/2010/main" val="368202902"/>
+      </p:ext>
+    </p:extLst>
+  </p:cSld>
+  <p:clrMapOvr>
+    <a:masterClrMapping/>
+  </p:clrMapOvr>
+</p:sld>
+</file>
+
+<file path=ppt/slides/slide61.xml><?xml version="1.0" encoding="utf-8"?>
+<p:sld xmlns:a="http://schemas.openxmlformats.org/drawingml/2006/main" xmlns:r="http://schemas.openxmlformats.org/officeDocument/2006/relationships" xmlns:p="http://schemas.openxmlformats.org/presentationml/2006/main">
+  <p:cSld>
+    <p:spTree>
+      <p:nvGrpSpPr>
+        <p:cNvPr id="1" name=""/>
+        <p:cNvGrpSpPr/>
+        <p:nvPr/>
+      </p:nvGrpSpPr>
+      <p:grpSpPr>
+        <a:xfrm>
+          <a:off x="0" y="0"/>
+          <a:ext cx="0" cy="0"/>
+          <a:chOff x="0" y="0"/>
+          <a:chExt cx="0" cy="0"/>
+        </a:xfrm>
+      </p:grpSpPr>
+      <p:sp>
+        <p:nvSpPr>
+          <p:cNvPr id="2" name="Title 1"/>
+          <p:cNvSpPr>
+            <a:spLocks noGrp="1"/>
+          </p:cNvSpPr>
+          <p:nvPr>
+            <p:ph type="title"/>
+          </p:nvPr>
+        </p:nvSpPr>
+        <p:spPr>
+          <a:xfrm>
+            <a:off x="838200" y="365126"/>
+            <a:ext cx="10515600" cy="710640"/>
+          </a:xfrm>
+        </p:spPr>
+        <p:txBody>
+          <a:bodyPr>
+            <a:normAutofit/>
+          </a:bodyPr>
+          <a:lstStyle/>
+          <a:p>
+            <a:r>
               <a:rPr lang="en-US" sz="3200" dirty="0" smtClean="0"/>
               <a:t>Reference</a:t>
             </a:r>
@@ -31037,7 +31260,7 @@
           <a:p>
             <a:fld id="{5F6DF98B-7C24-4C4A-9857-F9CABD08DE4C}" type="slidenum">
               <a:rPr lang="en-US" smtClean="0"/>
-              <a:t>60</a:t>
+              <a:t>61</a:t>
             </a:fld>
             <a:endParaRPr lang="en-US"/>
           </a:p>
@@ -31362,7 +31585,7 @@
           <a:p>
             <a:fld id="{D60F355B-B081-7348-9FD0-DB378FD709E6}" type="datetime1">
               <a:rPr lang="en-US" smtClean="0"/>
-              <a:t>3/23/16</a:t>
+              <a:t>3/24/16</a:t>
             </a:fld>
             <a:endParaRPr lang="en-US"/>
           </a:p>
@@ -31696,7 +31919,7 @@
           <a:p>
             <a:fld id="{D60F355B-B081-7348-9FD0-DB378FD709E6}" type="datetime1">
               <a:rPr lang="en-US" smtClean="0"/>
-              <a:t>3/23/16</a:t>
+              <a:t>3/24/16</a:t>
             </a:fld>
             <a:endParaRPr lang="en-US"/>
           </a:p>
@@ -31904,7 +32127,7 @@
           <a:p>
             <a:fld id="{D60F355B-B081-7348-9FD0-DB378FD709E6}" type="datetime1">
               <a:rPr lang="en-US" smtClean="0"/>
-              <a:t>3/23/16</a:t>
+              <a:t>3/24/16</a:t>
             </a:fld>
             <a:endParaRPr lang="en-US"/>
           </a:p>

</xml_diff>